<commit_message>
Add slides + extend resources
</commit_message>
<xml_diff>
--- a/ngMeetup.pptx
+++ b/ngMeetup.pptx
@@ -5,7 +5,7 @@
     <p:sldMasterId id="2147483648" r:id="rId1"/>
   </p:sldMasterIdLst>
   <p:notesMasterIdLst>
-    <p:notesMasterId r:id="rId7"/>
+    <p:notesMasterId r:id="rId11"/>
   </p:notesMasterIdLst>
   <p:sldIdLst>
     <p:sldId id="256" r:id="rId2"/>
@@ -13,6 +13,10 @@
     <p:sldId id="259" r:id="rId4"/>
     <p:sldId id="260" r:id="rId5"/>
     <p:sldId id="258" r:id="rId6"/>
+    <p:sldId id="261" r:id="rId7"/>
+    <p:sldId id="262" r:id="rId8"/>
+    <p:sldId id="263" r:id="rId9"/>
+    <p:sldId id="264" r:id="rId10"/>
   </p:sldIdLst>
   <p:sldSz cx="12192000" cy="6858000"/>
   <p:notesSz cx="6858000" cy="9144000"/>
@@ -212,7 +216,7 @@
           <a:p>
             <a:fld id="{3C984E42-C6CA-4C97-96C7-CA2C1EC7B515}" type="datetimeFigureOut">
               <a:rPr lang="bg-BG" smtClean="0"/>
-              <a:t>21.4.2019 г.</a:t>
+              <a:t>23.04.2019</a:t>
             </a:fld>
             <a:endParaRPr lang="bg-BG"/>
           </a:p>
@@ -701,6 +705,18 @@
             </a:r>
           </a:p>
           <a:p>
+            <a:r>
+              <a:rPr lang="en-US" sz="1200" b="0" kern="1200" dirty="0">
+                <a:solidFill>
+                  <a:schemeClr val="tx1"/>
+                </a:solidFill>
+                <a:effectLst/>
+                <a:latin typeface="+mn-lt"/>
+                <a:ea typeface="+mn-ea"/>
+                <a:cs typeface="+mn-cs"/>
+              </a:rPr>
+              <a:t/>
+            </a:r>
             <a:br>
               <a:rPr lang="en-US" sz="1200" b="0" kern="1200" dirty="0">
                 <a:solidFill>
@@ -726,6 +742,18 @@
             </a:r>
           </a:p>
           <a:p>
+            <a:r>
+              <a:rPr lang="en-US" sz="1200" b="0" kern="1200" dirty="0">
+                <a:solidFill>
+                  <a:schemeClr val="tx1"/>
+                </a:solidFill>
+                <a:effectLst/>
+                <a:latin typeface="+mn-lt"/>
+                <a:ea typeface="+mn-ea"/>
+                <a:cs typeface="+mn-cs"/>
+              </a:rPr>
+              <a:t/>
+            </a:r>
             <a:br>
               <a:rPr lang="en-US" sz="1200" b="0" kern="1200" dirty="0">
                 <a:solidFill>
@@ -899,6 +927,174 @@
 </p:notes>
 </file>
 
+<file path=ppt/notesSlides/notesSlide4.xml><?xml version="1.0" encoding="utf-8"?>
+<p:notes xmlns:a="http://schemas.openxmlformats.org/drawingml/2006/main" xmlns:r="http://schemas.openxmlformats.org/officeDocument/2006/relationships" xmlns:p="http://schemas.openxmlformats.org/presentationml/2006/main">
+  <p:cSld>
+    <p:spTree>
+      <p:nvGrpSpPr>
+        <p:cNvPr id="1" name=""/>
+        <p:cNvGrpSpPr/>
+        <p:nvPr/>
+      </p:nvGrpSpPr>
+      <p:grpSpPr>
+        <a:xfrm>
+          <a:off x="0" y="0"/>
+          <a:ext cx="0" cy="0"/>
+          <a:chOff x="0" y="0"/>
+          <a:chExt cx="0" cy="0"/>
+        </a:xfrm>
+      </p:grpSpPr>
+      <p:sp>
+        <p:nvSpPr>
+          <p:cNvPr id="2" name="Slide Image Placeholder 1"/>
+          <p:cNvSpPr>
+            <a:spLocks noGrp="1" noRot="1" noChangeAspect="1"/>
+          </p:cNvSpPr>
+          <p:nvPr>
+            <p:ph type="sldImg"/>
+          </p:nvPr>
+        </p:nvSpPr>
+        <p:spPr/>
+      </p:sp>
+      <p:sp>
+        <p:nvSpPr>
+          <p:cNvPr id="3" name="Notes Placeholder 2"/>
+          <p:cNvSpPr>
+            <a:spLocks noGrp="1"/>
+          </p:cNvSpPr>
+          <p:nvPr>
+            <p:ph type="body" idx="1"/>
+          </p:nvPr>
+        </p:nvSpPr>
+        <p:spPr/>
+        <p:txBody>
+          <a:bodyPr/>
+          <a:lstStyle/>
+          <a:p>
+            <a:endParaRPr lang="bg-BG" dirty="0"/>
+          </a:p>
+        </p:txBody>
+      </p:sp>
+      <p:sp>
+        <p:nvSpPr>
+          <p:cNvPr id="4" name="Slide Number Placeholder 3"/>
+          <p:cNvSpPr>
+            <a:spLocks noGrp="1"/>
+          </p:cNvSpPr>
+          <p:nvPr>
+            <p:ph type="sldNum" sz="quarter" idx="10"/>
+          </p:nvPr>
+        </p:nvSpPr>
+        <p:spPr/>
+        <p:txBody>
+          <a:bodyPr/>
+          <a:lstStyle/>
+          <a:p>
+            <a:fld id="{9571CB9B-B82F-460B-B086-0250925F788A}" type="slidenum">
+              <a:rPr lang="bg-BG" smtClean="0"/>
+              <a:t>8</a:t>
+            </a:fld>
+            <a:endParaRPr lang="bg-BG"/>
+          </a:p>
+        </p:txBody>
+      </p:sp>
+    </p:spTree>
+    <p:extLst>
+      <p:ext uri="{BB962C8B-B14F-4D97-AF65-F5344CB8AC3E}">
+        <p14:creationId xmlns:p14="http://schemas.microsoft.com/office/powerpoint/2010/main" val="399952680"/>
+      </p:ext>
+    </p:extLst>
+  </p:cSld>
+  <p:clrMapOvr>
+    <a:masterClrMapping/>
+  </p:clrMapOvr>
+</p:notes>
+</file>
+
+<file path=ppt/notesSlides/notesSlide5.xml><?xml version="1.0" encoding="utf-8"?>
+<p:notes xmlns:a="http://schemas.openxmlformats.org/drawingml/2006/main" xmlns:r="http://schemas.openxmlformats.org/officeDocument/2006/relationships" xmlns:p="http://schemas.openxmlformats.org/presentationml/2006/main">
+  <p:cSld>
+    <p:spTree>
+      <p:nvGrpSpPr>
+        <p:cNvPr id="1" name=""/>
+        <p:cNvGrpSpPr/>
+        <p:nvPr/>
+      </p:nvGrpSpPr>
+      <p:grpSpPr>
+        <a:xfrm>
+          <a:off x="0" y="0"/>
+          <a:ext cx="0" cy="0"/>
+          <a:chOff x="0" y="0"/>
+          <a:chExt cx="0" cy="0"/>
+        </a:xfrm>
+      </p:grpSpPr>
+      <p:sp>
+        <p:nvSpPr>
+          <p:cNvPr id="2" name="Slide Image Placeholder 1"/>
+          <p:cNvSpPr>
+            <a:spLocks noGrp="1" noRot="1" noChangeAspect="1"/>
+          </p:cNvSpPr>
+          <p:nvPr>
+            <p:ph type="sldImg"/>
+          </p:nvPr>
+        </p:nvSpPr>
+        <p:spPr/>
+      </p:sp>
+      <p:sp>
+        <p:nvSpPr>
+          <p:cNvPr id="3" name="Notes Placeholder 2"/>
+          <p:cNvSpPr>
+            <a:spLocks noGrp="1"/>
+          </p:cNvSpPr>
+          <p:nvPr>
+            <p:ph type="body" idx="1"/>
+          </p:nvPr>
+        </p:nvSpPr>
+        <p:spPr/>
+        <p:txBody>
+          <a:bodyPr/>
+          <a:lstStyle/>
+          <a:p>
+            <a:endParaRPr lang="bg-BG" dirty="0"/>
+          </a:p>
+        </p:txBody>
+      </p:sp>
+      <p:sp>
+        <p:nvSpPr>
+          <p:cNvPr id="4" name="Slide Number Placeholder 3"/>
+          <p:cNvSpPr>
+            <a:spLocks noGrp="1"/>
+          </p:cNvSpPr>
+          <p:nvPr>
+            <p:ph type="sldNum" sz="quarter" idx="10"/>
+          </p:nvPr>
+        </p:nvSpPr>
+        <p:spPr/>
+        <p:txBody>
+          <a:bodyPr/>
+          <a:lstStyle/>
+          <a:p>
+            <a:fld id="{9571CB9B-B82F-460B-B086-0250925F788A}" type="slidenum">
+              <a:rPr lang="bg-BG" smtClean="0"/>
+              <a:t>9</a:t>
+            </a:fld>
+            <a:endParaRPr lang="bg-BG"/>
+          </a:p>
+        </p:txBody>
+      </p:sp>
+    </p:spTree>
+    <p:extLst>
+      <p:ext uri="{BB962C8B-B14F-4D97-AF65-F5344CB8AC3E}">
+        <p14:creationId xmlns:p14="http://schemas.microsoft.com/office/powerpoint/2010/main" val="271450014"/>
+      </p:ext>
+    </p:extLst>
+  </p:cSld>
+  <p:clrMapOvr>
+    <a:masterClrMapping/>
+  </p:clrMapOvr>
+</p:notes>
+</file>
+
 <file path=ppt/slideLayouts/slideLayout1.xml><?xml version="1.0" encoding="utf-8"?>
 <p:sldLayout xmlns:a="http://schemas.openxmlformats.org/drawingml/2006/main" xmlns:r="http://schemas.openxmlformats.org/officeDocument/2006/relationships" xmlns:p="http://schemas.openxmlformats.org/presentationml/2006/main" type="title" preserve="1">
   <p:cSld name="Title Slide">
@@ -921,7 +1117,7 @@
           <p:cNvPr id="2" name="Title 1">
             <a:extLst>
               <a:ext uri="{FF2B5EF4-FFF2-40B4-BE49-F238E27FC236}">
-                <a16:creationId xmlns:a16="http://schemas.microsoft.com/office/drawing/2014/main" id="{F52F329B-8F4D-4D34-9A20-EC9D37A6EA6F}"/>
+                <a16:creationId xmlns:a16="http://schemas.microsoft.com/office/drawing/2014/main" xmlns="" id="{F52F329B-8F4D-4D34-9A20-EC9D37A6EA6F}"/>
               </a:ext>
             </a:extLst>
           </p:cNvPr>
@@ -959,7 +1155,7 @@
           <p:cNvPr id="3" name="Subtitle 2">
             <a:extLst>
               <a:ext uri="{FF2B5EF4-FFF2-40B4-BE49-F238E27FC236}">
-                <a16:creationId xmlns:a16="http://schemas.microsoft.com/office/drawing/2014/main" id="{F5B77F27-1E37-4511-B960-48A1347242BE}"/>
+                <a16:creationId xmlns:a16="http://schemas.microsoft.com/office/drawing/2014/main" xmlns="" id="{F5B77F27-1E37-4511-B960-48A1347242BE}"/>
               </a:ext>
             </a:extLst>
           </p:cNvPr>
@@ -1030,7 +1226,7 @@
           <p:cNvPr id="4" name="Date Placeholder 3">
             <a:extLst>
               <a:ext uri="{FF2B5EF4-FFF2-40B4-BE49-F238E27FC236}">
-                <a16:creationId xmlns:a16="http://schemas.microsoft.com/office/drawing/2014/main" id="{C601E8AD-EC4C-47B9-A42C-9156ACC995BD}"/>
+                <a16:creationId xmlns:a16="http://schemas.microsoft.com/office/drawing/2014/main" xmlns="" id="{C601E8AD-EC4C-47B9-A42C-9156ACC995BD}"/>
               </a:ext>
             </a:extLst>
           </p:cNvPr>
@@ -1048,7 +1244,7 @@
           <a:p>
             <a:fld id="{EEA75A29-027F-4D48-B08B-1161613C0818}" type="datetimeFigureOut">
               <a:rPr lang="bg-BG" smtClean="0"/>
-              <a:t>21.4.2019 г.</a:t>
+              <a:t>23.04.2019</a:t>
             </a:fld>
             <a:endParaRPr lang="bg-BG"/>
           </a:p>
@@ -1059,7 +1255,7 @@
           <p:cNvPr id="5" name="Footer Placeholder 4">
             <a:extLst>
               <a:ext uri="{FF2B5EF4-FFF2-40B4-BE49-F238E27FC236}">
-                <a16:creationId xmlns:a16="http://schemas.microsoft.com/office/drawing/2014/main" id="{3B1988CD-5B6D-4F0B-8B16-F638D10042F8}"/>
+                <a16:creationId xmlns:a16="http://schemas.microsoft.com/office/drawing/2014/main" xmlns="" id="{3B1988CD-5B6D-4F0B-8B16-F638D10042F8}"/>
               </a:ext>
             </a:extLst>
           </p:cNvPr>
@@ -1084,7 +1280,7 @@
           <p:cNvPr id="6" name="Slide Number Placeholder 5">
             <a:extLst>
               <a:ext uri="{FF2B5EF4-FFF2-40B4-BE49-F238E27FC236}">
-                <a16:creationId xmlns:a16="http://schemas.microsoft.com/office/drawing/2014/main" id="{207D070E-1DF5-454F-86BC-E61AA6A56FBD}"/>
+                <a16:creationId xmlns:a16="http://schemas.microsoft.com/office/drawing/2014/main" xmlns="" id="{207D070E-1DF5-454F-86BC-E61AA6A56FBD}"/>
               </a:ext>
             </a:extLst>
           </p:cNvPr>
@@ -1143,7 +1339,7 @@
           <p:cNvPr id="2" name="Title 1">
             <a:extLst>
               <a:ext uri="{FF2B5EF4-FFF2-40B4-BE49-F238E27FC236}">
-                <a16:creationId xmlns:a16="http://schemas.microsoft.com/office/drawing/2014/main" id="{AD6C6CA6-2395-442E-A4AA-BFBD8D857358}"/>
+                <a16:creationId xmlns:a16="http://schemas.microsoft.com/office/drawing/2014/main" xmlns="" id="{AD6C6CA6-2395-442E-A4AA-BFBD8D857358}"/>
               </a:ext>
             </a:extLst>
           </p:cNvPr>
@@ -1172,7 +1368,7 @@
           <p:cNvPr id="3" name="Vertical Text Placeholder 2">
             <a:extLst>
               <a:ext uri="{FF2B5EF4-FFF2-40B4-BE49-F238E27FC236}">
-                <a16:creationId xmlns:a16="http://schemas.microsoft.com/office/drawing/2014/main" id="{0139AA31-FD62-4FCB-982C-F22C6405F614}"/>
+                <a16:creationId xmlns:a16="http://schemas.microsoft.com/office/drawing/2014/main" xmlns="" id="{0139AA31-FD62-4FCB-982C-F22C6405F614}"/>
               </a:ext>
             </a:extLst>
           </p:cNvPr>
@@ -1230,7 +1426,7 @@
           <p:cNvPr id="4" name="Date Placeholder 3">
             <a:extLst>
               <a:ext uri="{FF2B5EF4-FFF2-40B4-BE49-F238E27FC236}">
-                <a16:creationId xmlns:a16="http://schemas.microsoft.com/office/drawing/2014/main" id="{DE3FFBBE-5BD3-438C-A2F5-198F5F87F570}"/>
+                <a16:creationId xmlns:a16="http://schemas.microsoft.com/office/drawing/2014/main" xmlns="" id="{DE3FFBBE-5BD3-438C-A2F5-198F5F87F570}"/>
               </a:ext>
             </a:extLst>
           </p:cNvPr>
@@ -1248,7 +1444,7 @@
           <a:p>
             <a:fld id="{EEA75A29-027F-4D48-B08B-1161613C0818}" type="datetimeFigureOut">
               <a:rPr lang="bg-BG" smtClean="0"/>
-              <a:t>21.4.2019 г.</a:t>
+              <a:t>23.04.2019</a:t>
             </a:fld>
             <a:endParaRPr lang="bg-BG"/>
           </a:p>
@@ -1259,7 +1455,7 @@
           <p:cNvPr id="5" name="Footer Placeholder 4">
             <a:extLst>
               <a:ext uri="{FF2B5EF4-FFF2-40B4-BE49-F238E27FC236}">
-                <a16:creationId xmlns:a16="http://schemas.microsoft.com/office/drawing/2014/main" id="{FE025B39-2326-4AC9-8DCC-E340AC398D86}"/>
+                <a16:creationId xmlns:a16="http://schemas.microsoft.com/office/drawing/2014/main" xmlns="" id="{FE025B39-2326-4AC9-8DCC-E340AC398D86}"/>
               </a:ext>
             </a:extLst>
           </p:cNvPr>
@@ -1284,7 +1480,7 @@
           <p:cNvPr id="6" name="Slide Number Placeholder 5">
             <a:extLst>
               <a:ext uri="{FF2B5EF4-FFF2-40B4-BE49-F238E27FC236}">
-                <a16:creationId xmlns:a16="http://schemas.microsoft.com/office/drawing/2014/main" id="{E5C1BF7B-431E-408F-9076-97CDF2605450}"/>
+                <a16:creationId xmlns:a16="http://schemas.microsoft.com/office/drawing/2014/main" xmlns="" id="{E5C1BF7B-431E-408F-9076-97CDF2605450}"/>
               </a:ext>
             </a:extLst>
           </p:cNvPr>
@@ -1343,7 +1539,7 @@
           <p:cNvPr id="2" name="Vertical Title 1">
             <a:extLst>
               <a:ext uri="{FF2B5EF4-FFF2-40B4-BE49-F238E27FC236}">
-                <a16:creationId xmlns:a16="http://schemas.microsoft.com/office/drawing/2014/main" id="{91A66527-2452-4D8B-BF5D-54D5FFB33125}"/>
+                <a16:creationId xmlns:a16="http://schemas.microsoft.com/office/drawing/2014/main" xmlns="" id="{91A66527-2452-4D8B-BF5D-54D5FFB33125}"/>
               </a:ext>
             </a:extLst>
           </p:cNvPr>
@@ -1377,7 +1573,7 @@
           <p:cNvPr id="3" name="Vertical Text Placeholder 2">
             <a:extLst>
               <a:ext uri="{FF2B5EF4-FFF2-40B4-BE49-F238E27FC236}">
-                <a16:creationId xmlns:a16="http://schemas.microsoft.com/office/drawing/2014/main" id="{CAB8B2E5-AA57-4039-BCAC-1B6BDF04D621}"/>
+                <a16:creationId xmlns:a16="http://schemas.microsoft.com/office/drawing/2014/main" xmlns="" id="{CAB8B2E5-AA57-4039-BCAC-1B6BDF04D621}"/>
               </a:ext>
             </a:extLst>
           </p:cNvPr>
@@ -1440,7 +1636,7 @@
           <p:cNvPr id="4" name="Date Placeholder 3">
             <a:extLst>
               <a:ext uri="{FF2B5EF4-FFF2-40B4-BE49-F238E27FC236}">
-                <a16:creationId xmlns:a16="http://schemas.microsoft.com/office/drawing/2014/main" id="{E2E4D11A-A720-42C9-8902-A303288DF63E}"/>
+                <a16:creationId xmlns:a16="http://schemas.microsoft.com/office/drawing/2014/main" xmlns="" id="{E2E4D11A-A720-42C9-8902-A303288DF63E}"/>
               </a:ext>
             </a:extLst>
           </p:cNvPr>
@@ -1458,7 +1654,7 @@
           <a:p>
             <a:fld id="{EEA75A29-027F-4D48-B08B-1161613C0818}" type="datetimeFigureOut">
               <a:rPr lang="bg-BG" smtClean="0"/>
-              <a:t>21.4.2019 г.</a:t>
+              <a:t>23.04.2019</a:t>
             </a:fld>
             <a:endParaRPr lang="bg-BG"/>
           </a:p>
@@ -1469,7 +1665,7 @@
           <p:cNvPr id="5" name="Footer Placeholder 4">
             <a:extLst>
               <a:ext uri="{FF2B5EF4-FFF2-40B4-BE49-F238E27FC236}">
-                <a16:creationId xmlns:a16="http://schemas.microsoft.com/office/drawing/2014/main" id="{CDC9BE18-F0AB-42F9-B0B0-4C1636235DD0}"/>
+                <a16:creationId xmlns:a16="http://schemas.microsoft.com/office/drawing/2014/main" xmlns="" id="{CDC9BE18-F0AB-42F9-B0B0-4C1636235DD0}"/>
               </a:ext>
             </a:extLst>
           </p:cNvPr>
@@ -1494,7 +1690,7 @@
           <p:cNvPr id="6" name="Slide Number Placeholder 5">
             <a:extLst>
               <a:ext uri="{FF2B5EF4-FFF2-40B4-BE49-F238E27FC236}">
-                <a16:creationId xmlns:a16="http://schemas.microsoft.com/office/drawing/2014/main" id="{109AE838-56B7-4AB0-9C1A-7A8FE9EFBD3D}"/>
+                <a16:creationId xmlns:a16="http://schemas.microsoft.com/office/drawing/2014/main" xmlns="" id="{109AE838-56B7-4AB0-9C1A-7A8FE9EFBD3D}"/>
               </a:ext>
             </a:extLst>
           </p:cNvPr>
@@ -1553,7 +1749,7 @@
           <p:cNvPr id="2" name="Title 1">
             <a:extLst>
               <a:ext uri="{FF2B5EF4-FFF2-40B4-BE49-F238E27FC236}">
-                <a16:creationId xmlns:a16="http://schemas.microsoft.com/office/drawing/2014/main" id="{93232693-D83E-496D-B1F0-18FD480E8F6F}"/>
+                <a16:creationId xmlns:a16="http://schemas.microsoft.com/office/drawing/2014/main" xmlns="" id="{93232693-D83E-496D-B1F0-18FD480E8F6F}"/>
               </a:ext>
             </a:extLst>
           </p:cNvPr>
@@ -1582,7 +1778,7 @@
           <p:cNvPr id="3" name="Content Placeholder 2">
             <a:extLst>
               <a:ext uri="{FF2B5EF4-FFF2-40B4-BE49-F238E27FC236}">
-                <a16:creationId xmlns:a16="http://schemas.microsoft.com/office/drawing/2014/main" id="{D7124242-15EA-4F8F-B8C2-C9A78655494B}"/>
+                <a16:creationId xmlns:a16="http://schemas.microsoft.com/office/drawing/2014/main" xmlns="" id="{D7124242-15EA-4F8F-B8C2-C9A78655494B}"/>
               </a:ext>
             </a:extLst>
           </p:cNvPr>
@@ -1640,7 +1836,7 @@
           <p:cNvPr id="4" name="Date Placeholder 3">
             <a:extLst>
               <a:ext uri="{FF2B5EF4-FFF2-40B4-BE49-F238E27FC236}">
-                <a16:creationId xmlns:a16="http://schemas.microsoft.com/office/drawing/2014/main" id="{0D33C9EA-53D6-4F1F-92EF-8CE3257DE475}"/>
+                <a16:creationId xmlns:a16="http://schemas.microsoft.com/office/drawing/2014/main" xmlns="" id="{0D33C9EA-53D6-4F1F-92EF-8CE3257DE475}"/>
               </a:ext>
             </a:extLst>
           </p:cNvPr>
@@ -1658,7 +1854,7 @@
           <a:p>
             <a:fld id="{EEA75A29-027F-4D48-B08B-1161613C0818}" type="datetimeFigureOut">
               <a:rPr lang="bg-BG" smtClean="0"/>
-              <a:t>21.4.2019 г.</a:t>
+              <a:t>23.04.2019</a:t>
             </a:fld>
             <a:endParaRPr lang="bg-BG"/>
           </a:p>
@@ -1669,7 +1865,7 @@
           <p:cNvPr id="5" name="Footer Placeholder 4">
             <a:extLst>
               <a:ext uri="{FF2B5EF4-FFF2-40B4-BE49-F238E27FC236}">
-                <a16:creationId xmlns:a16="http://schemas.microsoft.com/office/drawing/2014/main" id="{2B69D87B-7004-49FB-A3A9-D69E867363C9}"/>
+                <a16:creationId xmlns:a16="http://schemas.microsoft.com/office/drawing/2014/main" xmlns="" id="{2B69D87B-7004-49FB-A3A9-D69E867363C9}"/>
               </a:ext>
             </a:extLst>
           </p:cNvPr>
@@ -1694,7 +1890,7 @@
           <p:cNvPr id="6" name="Slide Number Placeholder 5">
             <a:extLst>
               <a:ext uri="{FF2B5EF4-FFF2-40B4-BE49-F238E27FC236}">
-                <a16:creationId xmlns:a16="http://schemas.microsoft.com/office/drawing/2014/main" id="{22F55DA7-F5F4-4DA6-9A0C-A678C7BCC506}"/>
+                <a16:creationId xmlns:a16="http://schemas.microsoft.com/office/drawing/2014/main" xmlns="" id="{22F55DA7-F5F4-4DA6-9A0C-A678C7BCC506}"/>
               </a:ext>
             </a:extLst>
           </p:cNvPr>
@@ -1753,7 +1949,7 @@
           <p:cNvPr id="2" name="Title 1">
             <a:extLst>
               <a:ext uri="{FF2B5EF4-FFF2-40B4-BE49-F238E27FC236}">
-                <a16:creationId xmlns:a16="http://schemas.microsoft.com/office/drawing/2014/main" id="{3A7F5CED-A21C-48A1-AB1B-D3467B455802}"/>
+                <a16:creationId xmlns:a16="http://schemas.microsoft.com/office/drawing/2014/main" xmlns="" id="{3A7F5CED-A21C-48A1-AB1B-D3467B455802}"/>
               </a:ext>
             </a:extLst>
           </p:cNvPr>
@@ -1791,7 +1987,7 @@
           <p:cNvPr id="3" name="Text Placeholder 2">
             <a:extLst>
               <a:ext uri="{FF2B5EF4-FFF2-40B4-BE49-F238E27FC236}">
-                <a16:creationId xmlns:a16="http://schemas.microsoft.com/office/drawing/2014/main" id="{D3D4040B-60D3-4CF2-BB0C-992C021A6951}"/>
+                <a16:creationId xmlns:a16="http://schemas.microsoft.com/office/drawing/2014/main" xmlns="" id="{D3D4040B-60D3-4CF2-BB0C-992C021A6951}"/>
               </a:ext>
             </a:extLst>
           </p:cNvPr>
@@ -1916,7 +2112,7 @@
           <p:cNvPr id="4" name="Date Placeholder 3">
             <a:extLst>
               <a:ext uri="{FF2B5EF4-FFF2-40B4-BE49-F238E27FC236}">
-                <a16:creationId xmlns:a16="http://schemas.microsoft.com/office/drawing/2014/main" id="{C7658605-40AC-4FD4-9546-A13FABE6B36A}"/>
+                <a16:creationId xmlns:a16="http://schemas.microsoft.com/office/drawing/2014/main" xmlns="" id="{C7658605-40AC-4FD4-9546-A13FABE6B36A}"/>
               </a:ext>
             </a:extLst>
           </p:cNvPr>
@@ -1934,7 +2130,7 @@
           <a:p>
             <a:fld id="{EEA75A29-027F-4D48-B08B-1161613C0818}" type="datetimeFigureOut">
               <a:rPr lang="bg-BG" smtClean="0"/>
-              <a:t>21.4.2019 г.</a:t>
+              <a:t>23.04.2019</a:t>
             </a:fld>
             <a:endParaRPr lang="bg-BG"/>
           </a:p>
@@ -1945,7 +2141,7 @@
           <p:cNvPr id="5" name="Footer Placeholder 4">
             <a:extLst>
               <a:ext uri="{FF2B5EF4-FFF2-40B4-BE49-F238E27FC236}">
-                <a16:creationId xmlns:a16="http://schemas.microsoft.com/office/drawing/2014/main" id="{5CCBA4AD-AE6E-4907-BA96-345519E50CB3}"/>
+                <a16:creationId xmlns:a16="http://schemas.microsoft.com/office/drawing/2014/main" xmlns="" id="{5CCBA4AD-AE6E-4907-BA96-345519E50CB3}"/>
               </a:ext>
             </a:extLst>
           </p:cNvPr>
@@ -1970,7 +2166,7 @@
           <p:cNvPr id="6" name="Slide Number Placeholder 5">
             <a:extLst>
               <a:ext uri="{FF2B5EF4-FFF2-40B4-BE49-F238E27FC236}">
-                <a16:creationId xmlns:a16="http://schemas.microsoft.com/office/drawing/2014/main" id="{55D38E3D-2A6B-46B5-9A1B-936EAC403EF2}"/>
+                <a16:creationId xmlns:a16="http://schemas.microsoft.com/office/drawing/2014/main" xmlns="" id="{55D38E3D-2A6B-46B5-9A1B-936EAC403EF2}"/>
               </a:ext>
             </a:extLst>
           </p:cNvPr>
@@ -2029,7 +2225,7 @@
           <p:cNvPr id="2" name="Title 1">
             <a:extLst>
               <a:ext uri="{FF2B5EF4-FFF2-40B4-BE49-F238E27FC236}">
-                <a16:creationId xmlns:a16="http://schemas.microsoft.com/office/drawing/2014/main" id="{C3385F55-7DE7-4613-A710-50EB0BAD14BE}"/>
+                <a16:creationId xmlns:a16="http://schemas.microsoft.com/office/drawing/2014/main" xmlns="" id="{C3385F55-7DE7-4613-A710-50EB0BAD14BE}"/>
               </a:ext>
             </a:extLst>
           </p:cNvPr>
@@ -2058,7 +2254,7 @@
           <p:cNvPr id="3" name="Content Placeholder 2">
             <a:extLst>
               <a:ext uri="{FF2B5EF4-FFF2-40B4-BE49-F238E27FC236}">
-                <a16:creationId xmlns:a16="http://schemas.microsoft.com/office/drawing/2014/main" id="{A70042DF-4845-4EB9-A64A-08AFFBB91D3B}"/>
+                <a16:creationId xmlns:a16="http://schemas.microsoft.com/office/drawing/2014/main" xmlns="" id="{A70042DF-4845-4EB9-A64A-08AFFBB91D3B}"/>
               </a:ext>
             </a:extLst>
           </p:cNvPr>
@@ -2121,7 +2317,7 @@
           <p:cNvPr id="4" name="Content Placeholder 3">
             <a:extLst>
               <a:ext uri="{FF2B5EF4-FFF2-40B4-BE49-F238E27FC236}">
-                <a16:creationId xmlns:a16="http://schemas.microsoft.com/office/drawing/2014/main" id="{0CE2A731-9DFD-4A75-9630-3A93EA4414D6}"/>
+                <a16:creationId xmlns:a16="http://schemas.microsoft.com/office/drawing/2014/main" xmlns="" id="{0CE2A731-9DFD-4A75-9630-3A93EA4414D6}"/>
               </a:ext>
             </a:extLst>
           </p:cNvPr>
@@ -2184,7 +2380,7 @@
           <p:cNvPr id="5" name="Date Placeholder 4">
             <a:extLst>
               <a:ext uri="{FF2B5EF4-FFF2-40B4-BE49-F238E27FC236}">
-                <a16:creationId xmlns:a16="http://schemas.microsoft.com/office/drawing/2014/main" id="{1A784A54-E630-49CB-9644-A68C17FF00FC}"/>
+                <a16:creationId xmlns:a16="http://schemas.microsoft.com/office/drawing/2014/main" xmlns="" id="{1A784A54-E630-49CB-9644-A68C17FF00FC}"/>
               </a:ext>
             </a:extLst>
           </p:cNvPr>
@@ -2202,7 +2398,7 @@
           <a:p>
             <a:fld id="{EEA75A29-027F-4D48-B08B-1161613C0818}" type="datetimeFigureOut">
               <a:rPr lang="bg-BG" smtClean="0"/>
-              <a:t>21.4.2019 г.</a:t>
+              <a:t>23.04.2019</a:t>
             </a:fld>
             <a:endParaRPr lang="bg-BG"/>
           </a:p>
@@ -2213,7 +2409,7 @@
           <p:cNvPr id="6" name="Footer Placeholder 5">
             <a:extLst>
               <a:ext uri="{FF2B5EF4-FFF2-40B4-BE49-F238E27FC236}">
-                <a16:creationId xmlns:a16="http://schemas.microsoft.com/office/drawing/2014/main" id="{16E664AE-B7BE-4F74-9238-3752F763AD6A}"/>
+                <a16:creationId xmlns:a16="http://schemas.microsoft.com/office/drawing/2014/main" xmlns="" id="{16E664AE-B7BE-4F74-9238-3752F763AD6A}"/>
               </a:ext>
             </a:extLst>
           </p:cNvPr>
@@ -2238,7 +2434,7 @@
           <p:cNvPr id="7" name="Slide Number Placeholder 6">
             <a:extLst>
               <a:ext uri="{FF2B5EF4-FFF2-40B4-BE49-F238E27FC236}">
-                <a16:creationId xmlns:a16="http://schemas.microsoft.com/office/drawing/2014/main" id="{BC6BEAE7-D177-4EEF-BB4D-7F63857CD168}"/>
+                <a16:creationId xmlns:a16="http://schemas.microsoft.com/office/drawing/2014/main" xmlns="" id="{BC6BEAE7-D177-4EEF-BB4D-7F63857CD168}"/>
               </a:ext>
             </a:extLst>
           </p:cNvPr>
@@ -2297,7 +2493,7 @@
           <p:cNvPr id="2" name="Title 1">
             <a:extLst>
               <a:ext uri="{FF2B5EF4-FFF2-40B4-BE49-F238E27FC236}">
-                <a16:creationId xmlns:a16="http://schemas.microsoft.com/office/drawing/2014/main" id="{1EF4249D-FFEA-4E39-A413-6F7E03564681}"/>
+                <a16:creationId xmlns:a16="http://schemas.microsoft.com/office/drawing/2014/main" xmlns="" id="{1EF4249D-FFEA-4E39-A413-6F7E03564681}"/>
               </a:ext>
             </a:extLst>
           </p:cNvPr>
@@ -2331,7 +2527,7 @@
           <p:cNvPr id="3" name="Text Placeholder 2">
             <a:extLst>
               <a:ext uri="{FF2B5EF4-FFF2-40B4-BE49-F238E27FC236}">
-                <a16:creationId xmlns:a16="http://schemas.microsoft.com/office/drawing/2014/main" id="{A7C6EABA-3E75-436F-B822-8F4380F015BC}"/>
+                <a16:creationId xmlns:a16="http://schemas.microsoft.com/office/drawing/2014/main" xmlns="" id="{A7C6EABA-3E75-436F-B822-8F4380F015BC}"/>
               </a:ext>
             </a:extLst>
           </p:cNvPr>
@@ -2402,7 +2598,7 @@
           <p:cNvPr id="4" name="Content Placeholder 3">
             <a:extLst>
               <a:ext uri="{FF2B5EF4-FFF2-40B4-BE49-F238E27FC236}">
-                <a16:creationId xmlns:a16="http://schemas.microsoft.com/office/drawing/2014/main" id="{A9BFBE24-58EF-4117-B98C-A45C671CFCBB}"/>
+                <a16:creationId xmlns:a16="http://schemas.microsoft.com/office/drawing/2014/main" xmlns="" id="{A9BFBE24-58EF-4117-B98C-A45C671CFCBB}"/>
               </a:ext>
             </a:extLst>
           </p:cNvPr>
@@ -2465,7 +2661,7 @@
           <p:cNvPr id="5" name="Text Placeholder 4">
             <a:extLst>
               <a:ext uri="{FF2B5EF4-FFF2-40B4-BE49-F238E27FC236}">
-                <a16:creationId xmlns:a16="http://schemas.microsoft.com/office/drawing/2014/main" id="{D4C3D482-EE97-4FF2-A53E-8FC86DA14764}"/>
+                <a16:creationId xmlns:a16="http://schemas.microsoft.com/office/drawing/2014/main" xmlns="" id="{D4C3D482-EE97-4FF2-A53E-8FC86DA14764}"/>
               </a:ext>
             </a:extLst>
           </p:cNvPr>
@@ -2536,7 +2732,7 @@
           <p:cNvPr id="6" name="Content Placeholder 5">
             <a:extLst>
               <a:ext uri="{FF2B5EF4-FFF2-40B4-BE49-F238E27FC236}">
-                <a16:creationId xmlns:a16="http://schemas.microsoft.com/office/drawing/2014/main" id="{3259BEDD-0EA1-494B-A170-6680DDDF6114}"/>
+                <a16:creationId xmlns:a16="http://schemas.microsoft.com/office/drawing/2014/main" xmlns="" id="{3259BEDD-0EA1-494B-A170-6680DDDF6114}"/>
               </a:ext>
             </a:extLst>
           </p:cNvPr>
@@ -2599,7 +2795,7 @@
           <p:cNvPr id="7" name="Date Placeholder 6">
             <a:extLst>
               <a:ext uri="{FF2B5EF4-FFF2-40B4-BE49-F238E27FC236}">
-                <a16:creationId xmlns:a16="http://schemas.microsoft.com/office/drawing/2014/main" id="{88859E15-D2BF-4BD6-976C-1C0A4A40F469}"/>
+                <a16:creationId xmlns:a16="http://schemas.microsoft.com/office/drawing/2014/main" xmlns="" id="{88859E15-D2BF-4BD6-976C-1C0A4A40F469}"/>
               </a:ext>
             </a:extLst>
           </p:cNvPr>
@@ -2617,7 +2813,7 @@
           <a:p>
             <a:fld id="{EEA75A29-027F-4D48-B08B-1161613C0818}" type="datetimeFigureOut">
               <a:rPr lang="bg-BG" smtClean="0"/>
-              <a:t>21.4.2019 г.</a:t>
+              <a:t>23.04.2019</a:t>
             </a:fld>
             <a:endParaRPr lang="bg-BG"/>
           </a:p>
@@ -2628,7 +2824,7 @@
           <p:cNvPr id="8" name="Footer Placeholder 7">
             <a:extLst>
               <a:ext uri="{FF2B5EF4-FFF2-40B4-BE49-F238E27FC236}">
-                <a16:creationId xmlns:a16="http://schemas.microsoft.com/office/drawing/2014/main" id="{A1D2603C-8E07-43E2-BD2F-4C3F709DED92}"/>
+                <a16:creationId xmlns:a16="http://schemas.microsoft.com/office/drawing/2014/main" xmlns="" id="{A1D2603C-8E07-43E2-BD2F-4C3F709DED92}"/>
               </a:ext>
             </a:extLst>
           </p:cNvPr>
@@ -2653,7 +2849,7 @@
           <p:cNvPr id="9" name="Slide Number Placeholder 8">
             <a:extLst>
               <a:ext uri="{FF2B5EF4-FFF2-40B4-BE49-F238E27FC236}">
-                <a16:creationId xmlns:a16="http://schemas.microsoft.com/office/drawing/2014/main" id="{C25A8261-B0DA-4FFE-9EBF-C1D0C909685C}"/>
+                <a16:creationId xmlns:a16="http://schemas.microsoft.com/office/drawing/2014/main" xmlns="" id="{C25A8261-B0DA-4FFE-9EBF-C1D0C909685C}"/>
               </a:ext>
             </a:extLst>
           </p:cNvPr>
@@ -2712,7 +2908,7 @@
           <p:cNvPr id="2" name="Title 1">
             <a:extLst>
               <a:ext uri="{FF2B5EF4-FFF2-40B4-BE49-F238E27FC236}">
-                <a16:creationId xmlns:a16="http://schemas.microsoft.com/office/drawing/2014/main" id="{68199B5D-168F-4BCC-8B41-FAAA053FC84C}"/>
+                <a16:creationId xmlns:a16="http://schemas.microsoft.com/office/drawing/2014/main" xmlns="" id="{68199B5D-168F-4BCC-8B41-FAAA053FC84C}"/>
               </a:ext>
             </a:extLst>
           </p:cNvPr>
@@ -2741,7 +2937,7 @@
           <p:cNvPr id="3" name="Date Placeholder 2">
             <a:extLst>
               <a:ext uri="{FF2B5EF4-FFF2-40B4-BE49-F238E27FC236}">
-                <a16:creationId xmlns:a16="http://schemas.microsoft.com/office/drawing/2014/main" id="{E50AED76-4DC9-451C-B0CB-73FF4B908FA6}"/>
+                <a16:creationId xmlns:a16="http://schemas.microsoft.com/office/drawing/2014/main" xmlns="" id="{E50AED76-4DC9-451C-B0CB-73FF4B908FA6}"/>
               </a:ext>
             </a:extLst>
           </p:cNvPr>
@@ -2759,7 +2955,7 @@
           <a:p>
             <a:fld id="{EEA75A29-027F-4D48-B08B-1161613C0818}" type="datetimeFigureOut">
               <a:rPr lang="bg-BG" smtClean="0"/>
-              <a:t>21.4.2019 г.</a:t>
+              <a:t>23.04.2019</a:t>
             </a:fld>
             <a:endParaRPr lang="bg-BG"/>
           </a:p>
@@ -2770,7 +2966,7 @@
           <p:cNvPr id="4" name="Footer Placeholder 3">
             <a:extLst>
               <a:ext uri="{FF2B5EF4-FFF2-40B4-BE49-F238E27FC236}">
-                <a16:creationId xmlns:a16="http://schemas.microsoft.com/office/drawing/2014/main" id="{30116E03-A51E-44FA-A4FC-4E2CF1A7B86D}"/>
+                <a16:creationId xmlns:a16="http://schemas.microsoft.com/office/drawing/2014/main" xmlns="" id="{30116E03-A51E-44FA-A4FC-4E2CF1A7B86D}"/>
               </a:ext>
             </a:extLst>
           </p:cNvPr>
@@ -2795,7 +2991,7 @@
           <p:cNvPr id="5" name="Slide Number Placeholder 4">
             <a:extLst>
               <a:ext uri="{FF2B5EF4-FFF2-40B4-BE49-F238E27FC236}">
-                <a16:creationId xmlns:a16="http://schemas.microsoft.com/office/drawing/2014/main" id="{E8BB72F7-F4A4-45A6-AF88-74990BEEC45C}"/>
+                <a16:creationId xmlns:a16="http://schemas.microsoft.com/office/drawing/2014/main" xmlns="" id="{E8BB72F7-F4A4-45A6-AF88-74990BEEC45C}"/>
               </a:ext>
             </a:extLst>
           </p:cNvPr>
@@ -2854,7 +3050,7 @@
           <p:cNvPr id="2" name="Date Placeholder 1">
             <a:extLst>
               <a:ext uri="{FF2B5EF4-FFF2-40B4-BE49-F238E27FC236}">
-                <a16:creationId xmlns:a16="http://schemas.microsoft.com/office/drawing/2014/main" id="{7098F6A1-6902-4C8F-8C89-58FCAC8DE877}"/>
+                <a16:creationId xmlns:a16="http://schemas.microsoft.com/office/drawing/2014/main" xmlns="" id="{7098F6A1-6902-4C8F-8C89-58FCAC8DE877}"/>
               </a:ext>
             </a:extLst>
           </p:cNvPr>
@@ -2872,7 +3068,7 @@
           <a:p>
             <a:fld id="{EEA75A29-027F-4D48-B08B-1161613C0818}" type="datetimeFigureOut">
               <a:rPr lang="bg-BG" smtClean="0"/>
-              <a:t>21.4.2019 г.</a:t>
+              <a:t>23.04.2019</a:t>
             </a:fld>
             <a:endParaRPr lang="bg-BG"/>
           </a:p>
@@ -2883,7 +3079,7 @@
           <p:cNvPr id="3" name="Footer Placeholder 2">
             <a:extLst>
               <a:ext uri="{FF2B5EF4-FFF2-40B4-BE49-F238E27FC236}">
-                <a16:creationId xmlns:a16="http://schemas.microsoft.com/office/drawing/2014/main" id="{2210603F-7217-47C4-B45F-87B24133ACB3}"/>
+                <a16:creationId xmlns:a16="http://schemas.microsoft.com/office/drawing/2014/main" xmlns="" id="{2210603F-7217-47C4-B45F-87B24133ACB3}"/>
               </a:ext>
             </a:extLst>
           </p:cNvPr>
@@ -2908,7 +3104,7 @@
           <p:cNvPr id="4" name="Slide Number Placeholder 3">
             <a:extLst>
               <a:ext uri="{FF2B5EF4-FFF2-40B4-BE49-F238E27FC236}">
-                <a16:creationId xmlns:a16="http://schemas.microsoft.com/office/drawing/2014/main" id="{DD807AA2-F6E9-43C0-BE01-02161404E726}"/>
+                <a16:creationId xmlns:a16="http://schemas.microsoft.com/office/drawing/2014/main" xmlns="" id="{DD807AA2-F6E9-43C0-BE01-02161404E726}"/>
               </a:ext>
             </a:extLst>
           </p:cNvPr>
@@ -2967,7 +3163,7 @@
           <p:cNvPr id="2" name="Title 1">
             <a:extLst>
               <a:ext uri="{FF2B5EF4-FFF2-40B4-BE49-F238E27FC236}">
-                <a16:creationId xmlns:a16="http://schemas.microsoft.com/office/drawing/2014/main" id="{274E79D0-4A57-4D72-8BFF-AA07E2DBE2AA}"/>
+                <a16:creationId xmlns:a16="http://schemas.microsoft.com/office/drawing/2014/main" xmlns="" id="{274E79D0-4A57-4D72-8BFF-AA07E2DBE2AA}"/>
               </a:ext>
             </a:extLst>
           </p:cNvPr>
@@ -3005,7 +3201,7 @@
           <p:cNvPr id="3" name="Content Placeholder 2">
             <a:extLst>
               <a:ext uri="{FF2B5EF4-FFF2-40B4-BE49-F238E27FC236}">
-                <a16:creationId xmlns:a16="http://schemas.microsoft.com/office/drawing/2014/main" id="{C5F10B8E-BD65-4618-9F2A-8174963C8555}"/>
+                <a16:creationId xmlns:a16="http://schemas.microsoft.com/office/drawing/2014/main" xmlns="" id="{C5F10B8E-BD65-4618-9F2A-8174963C8555}"/>
               </a:ext>
             </a:extLst>
           </p:cNvPr>
@@ -3096,7 +3292,7 @@
           <p:cNvPr id="4" name="Text Placeholder 3">
             <a:extLst>
               <a:ext uri="{FF2B5EF4-FFF2-40B4-BE49-F238E27FC236}">
-                <a16:creationId xmlns:a16="http://schemas.microsoft.com/office/drawing/2014/main" id="{04CB69F9-BEF2-4790-B07A-274061846E82}"/>
+                <a16:creationId xmlns:a16="http://schemas.microsoft.com/office/drawing/2014/main" xmlns="" id="{04CB69F9-BEF2-4790-B07A-274061846E82}"/>
               </a:ext>
             </a:extLst>
           </p:cNvPr>
@@ -3167,7 +3363,7 @@
           <p:cNvPr id="5" name="Date Placeholder 4">
             <a:extLst>
               <a:ext uri="{FF2B5EF4-FFF2-40B4-BE49-F238E27FC236}">
-                <a16:creationId xmlns:a16="http://schemas.microsoft.com/office/drawing/2014/main" id="{51F1382C-CD99-4075-AB4B-9EF791ACA926}"/>
+                <a16:creationId xmlns:a16="http://schemas.microsoft.com/office/drawing/2014/main" xmlns="" id="{51F1382C-CD99-4075-AB4B-9EF791ACA926}"/>
               </a:ext>
             </a:extLst>
           </p:cNvPr>
@@ -3185,7 +3381,7 @@
           <a:p>
             <a:fld id="{EEA75A29-027F-4D48-B08B-1161613C0818}" type="datetimeFigureOut">
               <a:rPr lang="bg-BG" smtClean="0"/>
-              <a:t>21.4.2019 г.</a:t>
+              <a:t>23.04.2019</a:t>
             </a:fld>
             <a:endParaRPr lang="bg-BG"/>
           </a:p>
@@ -3196,7 +3392,7 @@
           <p:cNvPr id="6" name="Footer Placeholder 5">
             <a:extLst>
               <a:ext uri="{FF2B5EF4-FFF2-40B4-BE49-F238E27FC236}">
-                <a16:creationId xmlns:a16="http://schemas.microsoft.com/office/drawing/2014/main" id="{C25DFF43-D3BE-4042-BDFC-2998A5097955}"/>
+                <a16:creationId xmlns:a16="http://schemas.microsoft.com/office/drawing/2014/main" xmlns="" id="{C25DFF43-D3BE-4042-BDFC-2998A5097955}"/>
               </a:ext>
             </a:extLst>
           </p:cNvPr>
@@ -3221,7 +3417,7 @@
           <p:cNvPr id="7" name="Slide Number Placeholder 6">
             <a:extLst>
               <a:ext uri="{FF2B5EF4-FFF2-40B4-BE49-F238E27FC236}">
-                <a16:creationId xmlns:a16="http://schemas.microsoft.com/office/drawing/2014/main" id="{06312CA7-204D-43D7-993D-3F5D401DEB6E}"/>
+                <a16:creationId xmlns:a16="http://schemas.microsoft.com/office/drawing/2014/main" xmlns="" id="{06312CA7-204D-43D7-993D-3F5D401DEB6E}"/>
               </a:ext>
             </a:extLst>
           </p:cNvPr>
@@ -3280,7 +3476,7 @@
           <p:cNvPr id="2" name="Title 1">
             <a:extLst>
               <a:ext uri="{FF2B5EF4-FFF2-40B4-BE49-F238E27FC236}">
-                <a16:creationId xmlns:a16="http://schemas.microsoft.com/office/drawing/2014/main" id="{4D5B6D33-81B3-45CB-8DD1-3D215D78BD4A}"/>
+                <a16:creationId xmlns:a16="http://schemas.microsoft.com/office/drawing/2014/main" xmlns="" id="{4D5B6D33-81B3-45CB-8DD1-3D215D78BD4A}"/>
               </a:ext>
             </a:extLst>
           </p:cNvPr>
@@ -3318,7 +3514,7 @@
           <p:cNvPr id="3" name="Picture Placeholder 2">
             <a:extLst>
               <a:ext uri="{FF2B5EF4-FFF2-40B4-BE49-F238E27FC236}">
-                <a16:creationId xmlns:a16="http://schemas.microsoft.com/office/drawing/2014/main" id="{F496AEA4-445B-4253-90DA-EBFB28926940}"/>
+                <a16:creationId xmlns:a16="http://schemas.microsoft.com/office/drawing/2014/main" xmlns="" id="{F496AEA4-445B-4253-90DA-EBFB28926940}"/>
               </a:ext>
             </a:extLst>
           </p:cNvPr>
@@ -3385,7 +3581,7 @@
           <p:cNvPr id="4" name="Text Placeholder 3">
             <a:extLst>
               <a:ext uri="{FF2B5EF4-FFF2-40B4-BE49-F238E27FC236}">
-                <a16:creationId xmlns:a16="http://schemas.microsoft.com/office/drawing/2014/main" id="{82B8DA4B-177D-4CF9-8759-9FB35161325F}"/>
+                <a16:creationId xmlns:a16="http://schemas.microsoft.com/office/drawing/2014/main" xmlns="" id="{82B8DA4B-177D-4CF9-8759-9FB35161325F}"/>
               </a:ext>
             </a:extLst>
           </p:cNvPr>
@@ -3456,7 +3652,7 @@
           <p:cNvPr id="5" name="Date Placeholder 4">
             <a:extLst>
               <a:ext uri="{FF2B5EF4-FFF2-40B4-BE49-F238E27FC236}">
-                <a16:creationId xmlns:a16="http://schemas.microsoft.com/office/drawing/2014/main" id="{F5F44FF0-3C9E-4E02-AFCD-418CFDA06F99}"/>
+                <a16:creationId xmlns:a16="http://schemas.microsoft.com/office/drawing/2014/main" xmlns="" id="{F5F44FF0-3C9E-4E02-AFCD-418CFDA06F99}"/>
               </a:ext>
             </a:extLst>
           </p:cNvPr>
@@ -3474,7 +3670,7 @@
           <a:p>
             <a:fld id="{EEA75A29-027F-4D48-B08B-1161613C0818}" type="datetimeFigureOut">
               <a:rPr lang="bg-BG" smtClean="0"/>
-              <a:t>21.4.2019 г.</a:t>
+              <a:t>23.04.2019</a:t>
             </a:fld>
             <a:endParaRPr lang="bg-BG"/>
           </a:p>
@@ -3485,7 +3681,7 @@
           <p:cNvPr id="6" name="Footer Placeholder 5">
             <a:extLst>
               <a:ext uri="{FF2B5EF4-FFF2-40B4-BE49-F238E27FC236}">
-                <a16:creationId xmlns:a16="http://schemas.microsoft.com/office/drawing/2014/main" id="{5097DF82-2BBD-4019-848B-5FAC6D1F14ED}"/>
+                <a16:creationId xmlns:a16="http://schemas.microsoft.com/office/drawing/2014/main" xmlns="" id="{5097DF82-2BBD-4019-848B-5FAC6D1F14ED}"/>
               </a:ext>
             </a:extLst>
           </p:cNvPr>
@@ -3510,7 +3706,7 @@
           <p:cNvPr id="7" name="Slide Number Placeholder 6">
             <a:extLst>
               <a:ext uri="{FF2B5EF4-FFF2-40B4-BE49-F238E27FC236}">
-                <a16:creationId xmlns:a16="http://schemas.microsoft.com/office/drawing/2014/main" id="{F564C5BD-4D43-49A7-B528-9F4922E17A39}"/>
+                <a16:creationId xmlns:a16="http://schemas.microsoft.com/office/drawing/2014/main" xmlns="" id="{F564C5BD-4D43-49A7-B528-9F4922E17A39}"/>
               </a:ext>
             </a:extLst>
           </p:cNvPr>
@@ -3574,7 +3770,7 @@
           <p:cNvPr id="2" name="Title Placeholder 1">
             <a:extLst>
               <a:ext uri="{FF2B5EF4-FFF2-40B4-BE49-F238E27FC236}">
-                <a16:creationId xmlns:a16="http://schemas.microsoft.com/office/drawing/2014/main" id="{C62B9201-D64F-4E73-9D97-CDD35AFA9CD9}"/>
+                <a16:creationId xmlns:a16="http://schemas.microsoft.com/office/drawing/2014/main" xmlns="" id="{C62B9201-D64F-4E73-9D97-CDD35AFA9CD9}"/>
               </a:ext>
             </a:extLst>
           </p:cNvPr>
@@ -3613,7 +3809,7 @@
           <p:cNvPr id="3" name="Text Placeholder 2">
             <a:extLst>
               <a:ext uri="{FF2B5EF4-FFF2-40B4-BE49-F238E27FC236}">
-                <a16:creationId xmlns:a16="http://schemas.microsoft.com/office/drawing/2014/main" id="{750AD475-A6DB-444D-9126-24701712235D}"/>
+                <a16:creationId xmlns:a16="http://schemas.microsoft.com/office/drawing/2014/main" xmlns="" id="{750AD475-A6DB-444D-9126-24701712235D}"/>
               </a:ext>
             </a:extLst>
           </p:cNvPr>
@@ -3681,7 +3877,7 @@
           <p:cNvPr id="4" name="Date Placeholder 3">
             <a:extLst>
               <a:ext uri="{FF2B5EF4-FFF2-40B4-BE49-F238E27FC236}">
-                <a16:creationId xmlns:a16="http://schemas.microsoft.com/office/drawing/2014/main" id="{EAEEC826-FC13-4DC6-8680-1989B58B8840}"/>
+                <a16:creationId xmlns:a16="http://schemas.microsoft.com/office/drawing/2014/main" xmlns="" id="{EAEEC826-FC13-4DC6-8680-1989B58B8840}"/>
               </a:ext>
             </a:extLst>
           </p:cNvPr>
@@ -3717,7 +3913,7 @@
           <a:p>
             <a:fld id="{EEA75A29-027F-4D48-B08B-1161613C0818}" type="datetimeFigureOut">
               <a:rPr lang="bg-BG" smtClean="0"/>
-              <a:t>21.4.2019 г.</a:t>
+              <a:t>23.04.2019</a:t>
             </a:fld>
             <a:endParaRPr lang="bg-BG"/>
           </a:p>
@@ -3728,7 +3924,7 @@
           <p:cNvPr id="5" name="Footer Placeholder 4">
             <a:extLst>
               <a:ext uri="{FF2B5EF4-FFF2-40B4-BE49-F238E27FC236}">
-                <a16:creationId xmlns:a16="http://schemas.microsoft.com/office/drawing/2014/main" id="{CA44FEEC-545C-4523-8E78-9730A4DEA230}"/>
+                <a16:creationId xmlns:a16="http://schemas.microsoft.com/office/drawing/2014/main" xmlns="" id="{CA44FEEC-545C-4523-8E78-9730A4DEA230}"/>
               </a:ext>
             </a:extLst>
           </p:cNvPr>
@@ -3771,7 +3967,7 @@
           <p:cNvPr id="6" name="Slide Number Placeholder 5">
             <a:extLst>
               <a:ext uri="{FF2B5EF4-FFF2-40B4-BE49-F238E27FC236}">
-                <a16:creationId xmlns:a16="http://schemas.microsoft.com/office/drawing/2014/main" id="{73D22FDB-48CD-4DC6-AA72-C4D498CB8BE3}"/>
+                <a16:creationId xmlns:a16="http://schemas.microsoft.com/office/drawing/2014/main" xmlns="" id="{73D22FDB-48CD-4DC6-AA72-C4D498CB8BE3}"/>
               </a:ext>
             </a:extLst>
           </p:cNvPr>
@@ -4139,7 +4335,7 @@
           <p:cNvPr id="2" name="Title 1">
             <a:extLst>
               <a:ext uri="{FF2B5EF4-FFF2-40B4-BE49-F238E27FC236}">
-                <a16:creationId xmlns:a16="http://schemas.microsoft.com/office/drawing/2014/main" id="{D0065D8F-353D-4059-9C7F-F49723F8BC46}"/>
+                <a16:creationId xmlns:a16="http://schemas.microsoft.com/office/drawing/2014/main" xmlns="" id="{D0065D8F-353D-4059-9C7F-F49723F8BC46}"/>
               </a:ext>
             </a:extLst>
           </p:cNvPr>
@@ -4219,7 +4415,7 @@
           <p:cNvPr id="4" name="Picture 3">
             <a:extLst>
               <a:ext uri="{FF2B5EF4-FFF2-40B4-BE49-F238E27FC236}">
-                <a16:creationId xmlns:a16="http://schemas.microsoft.com/office/drawing/2014/main" id="{E806A265-91A3-44D3-A845-B5E74D32A225}"/>
+                <a16:creationId xmlns:a16="http://schemas.microsoft.com/office/drawing/2014/main" xmlns="" id="{E806A265-91A3-44D3-A845-B5E74D32A225}"/>
               </a:ext>
             </a:extLst>
           </p:cNvPr>
@@ -4266,7 +4462,7 @@
           <p:cNvPr id="5" name="Picture 4">
             <a:extLst>
               <a:ext uri="{FF2B5EF4-FFF2-40B4-BE49-F238E27FC236}">
-                <a16:creationId xmlns:a16="http://schemas.microsoft.com/office/drawing/2014/main" id="{1C373431-9E7B-4576-8831-13D67AF33226}"/>
+                <a16:creationId xmlns:a16="http://schemas.microsoft.com/office/drawing/2014/main" xmlns="" id="{1C373431-9E7B-4576-8831-13D67AF33226}"/>
               </a:ext>
             </a:extLst>
           </p:cNvPr>
@@ -4302,7 +4498,7 @@
           <p:cNvPr id="6" name="Text Placeholder 7">
             <a:extLst>
               <a:ext uri="{FF2B5EF4-FFF2-40B4-BE49-F238E27FC236}">
-                <a16:creationId xmlns:a16="http://schemas.microsoft.com/office/drawing/2014/main" id="{B7D9A7E4-7BA3-4E93-8912-98EFE09BB28A}"/>
+                <a16:creationId xmlns:a16="http://schemas.microsoft.com/office/drawing/2014/main" xmlns="" id="{B7D9A7E4-7BA3-4E93-8912-98EFE09BB28A}"/>
               </a:ext>
             </a:extLst>
           </p:cNvPr>
@@ -4555,7 +4751,7 @@
           <p:cNvPr id="7" name="Text Placeholder 7">
             <a:extLst>
               <a:ext uri="{FF2B5EF4-FFF2-40B4-BE49-F238E27FC236}">
-                <a16:creationId xmlns:a16="http://schemas.microsoft.com/office/drawing/2014/main" id="{C9C80F1A-C35F-401C-BE9E-EA2D52A62214}"/>
+                <a16:creationId xmlns:a16="http://schemas.microsoft.com/office/drawing/2014/main" xmlns="" id="{C9C80F1A-C35F-401C-BE9E-EA2D52A62214}"/>
               </a:ext>
             </a:extLst>
           </p:cNvPr>
@@ -4808,7 +5004,7 @@
           <p:cNvPr id="9" name="Picture 8">
             <a:extLst>
               <a:ext uri="{FF2B5EF4-FFF2-40B4-BE49-F238E27FC236}">
-                <a16:creationId xmlns:a16="http://schemas.microsoft.com/office/drawing/2014/main" id="{C4DC195B-1A46-49CD-A653-ED9AB3DD20A4}"/>
+                <a16:creationId xmlns:a16="http://schemas.microsoft.com/office/drawing/2014/main" xmlns="" id="{C4DC195B-1A46-49CD-A653-ED9AB3DD20A4}"/>
               </a:ext>
             </a:extLst>
           </p:cNvPr>
@@ -4868,7 +5064,7 @@
           <p:cNvPr id="11" name="Text Placeholder 7">
             <a:extLst>
               <a:ext uri="{FF2B5EF4-FFF2-40B4-BE49-F238E27FC236}">
-                <a16:creationId xmlns:a16="http://schemas.microsoft.com/office/drawing/2014/main" id="{61993706-1D78-48D5-9CE6-9BC974868574}"/>
+                <a16:creationId xmlns:a16="http://schemas.microsoft.com/office/drawing/2014/main" xmlns="" id="{61993706-1D78-48D5-9CE6-9BC974868574}"/>
               </a:ext>
             </a:extLst>
           </p:cNvPr>
@@ -5129,7 +5325,7 @@
           <p:cNvPr id="12" name="Text Placeholder 7">
             <a:extLst>
               <a:ext uri="{FF2B5EF4-FFF2-40B4-BE49-F238E27FC236}">
-                <a16:creationId xmlns:a16="http://schemas.microsoft.com/office/drawing/2014/main" id="{EBA61FC4-D80A-435C-B843-48032ACF0D9D}"/>
+                <a16:creationId xmlns:a16="http://schemas.microsoft.com/office/drawing/2014/main" xmlns="" id="{EBA61FC4-D80A-435C-B843-48032ACF0D9D}"/>
               </a:ext>
             </a:extLst>
           </p:cNvPr>
@@ -5382,7 +5578,7 @@
           <p:cNvPr id="13" name="Text Placeholder 7">
             <a:extLst>
               <a:ext uri="{FF2B5EF4-FFF2-40B4-BE49-F238E27FC236}">
-                <a16:creationId xmlns:a16="http://schemas.microsoft.com/office/drawing/2014/main" id="{A40570BA-6911-4970-9388-25F376540204}"/>
+                <a16:creationId xmlns:a16="http://schemas.microsoft.com/office/drawing/2014/main" xmlns="" id="{A40570BA-6911-4970-9388-25F376540204}"/>
               </a:ext>
             </a:extLst>
           </p:cNvPr>
@@ -5676,7 +5872,7 @@
           <p:cNvPr id="2" name="Title 1">
             <a:extLst>
               <a:ext uri="{FF2B5EF4-FFF2-40B4-BE49-F238E27FC236}">
-                <a16:creationId xmlns:a16="http://schemas.microsoft.com/office/drawing/2014/main" id="{2F078983-C003-476C-AF76-9D9D733F76FD}"/>
+                <a16:creationId xmlns:a16="http://schemas.microsoft.com/office/drawing/2014/main" xmlns="" id="{2F078983-C003-476C-AF76-9D9D733F76FD}"/>
               </a:ext>
             </a:extLst>
           </p:cNvPr>
@@ -5712,7 +5908,7 @@
           <p:cNvPr id="10" name="Content Placeholder 9">
             <a:extLst>
               <a:ext uri="{FF2B5EF4-FFF2-40B4-BE49-F238E27FC236}">
-                <a16:creationId xmlns:a16="http://schemas.microsoft.com/office/drawing/2014/main" id="{FA530467-8F23-4217-9082-0E932DD1816D}"/>
+                <a16:creationId xmlns:a16="http://schemas.microsoft.com/office/drawing/2014/main" xmlns="" id="{FA530467-8F23-4217-9082-0E932DD1816D}"/>
               </a:ext>
             </a:extLst>
           </p:cNvPr>
@@ -5725,8 +5921,8 @@
         </p:nvSpPr>
         <p:spPr>
           <a:xfrm>
-            <a:off x="762000" y="2279018"/>
-            <a:ext cx="5314543" cy="3375920"/>
+            <a:off x="762000" y="2279017"/>
+            <a:ext cx="5314543" cy="3852841"/>
           </a:xfrm>
         </p:spPr>
         <p:txBody>
@@ -5782,8 +5978,28 @@
             <a:pPr lvl="1"/>
             <a:r>
               <a:rPr lang="en-US" sz="1500" dirty="0"/>
-              <a:t>We are developing multiple application depending on common service</a:t>
-            </a:r>
+              <a:t>We are developing multiple application depending on common </a:t>
+            </a:r>
+            <a:r>
+              <a:rPr lang="en-US" sz="1500" dirty="0" smtClean="0"/>
+              <a:t>service</a:t>
+            </a:r>
+          </a:p>
+          <a:p>
+            <a:pPr lvl="1"/>
+            <a:r>
+              <a:rPr lang="en-US" sz="1500" dirty="0"/>
+              <a:t>We are continuously satisfying </a:t>
+            </a:r>
+            <a:r>
+              <a:rPr lang="en-US" sz="1500" dirty="0" smtClean="0"/>
+              <a:t>new business </a:t>
+            </a:r>
+            <a:r>
+              <a:rPr lang="en-US" sz="1500" dirty="0"/>
+              <a:t>requirements</a:t>
+            </a:r>
+            <a:endParaRPr lang="en-US" sz="1500" dirty="0"/>
           </a:p>
         </p:txBody>
       </p:sp>
@@ -5792,10 +6008,10 @@
           <p:cNvPr id="28" name="Freeform: Shape 27">
             <a:extLst>
               <a:ext uri="{FF2B5EF4-FFF2-40B4-BE49-F238E27FC236}">
-                <a16:creationId xmlns:a16="http://schemas.microsoft.com/office/drawing/2014/main" id="{CF62D2A7-8207-488C-9F46-316BA81A16C8}"/>
+                <a16:creationId xmlns:a16="http://schemas.microsoft.com/office/drawing/2014/main" xmlns="" id="{CF62D2A7-8207-488C-9F46-316BA81A16C8}"/>
               </a:ext>
               <a:ext uri="{C183D7F6-B498-43B3-948B-1728B52AA6E4}">
-                <adec:decorative xmlns:adec="http://schemas.microsoft.com/office/drawing/2017/decorative" val="1"/>
+                <adec:decorative xmlns:adec="http://schemas.microsoft.com/office/drawing/2017/decorative" xmlns="" val="1"/>
               </a:ext>
             </a:extLst>
           </p:cNvPr>
@@ -5805,7 +6021,7 @@
           <p:nvPr>
             <p:extLst>
               <p:ext uri="{386F3935-93C4-4BCD-93E2-E3B085C9AB24}">
-                <p16:designElem xmlns:p16="http://schemas.microsoft.com/office/powerpoint/2015/main" val="1"/>
+                <p16:designElem xmlns:p16="http://schemas.microsoft.com/office/powerpoint/2015/main" xmlns="" val="1"/>
               </p:ext>
             </p:extLst>
           </p:nvPr>
@@ -5959,7 +6175,7 @@
           <p:cNvPr id="23" name="Content Placeholder 4">
             <a:extLst>
               <a:ext uri="{FF2B5EF4-FFF2-40B4-BE49-F238E27FC236}">
-                <a16:creationId xmlns:a16="http://schemas.microsoft.com/office/drawing/2014/main" id="{80A64381-DDDA-41B6-8692-7D1CD7E4E200}"/>
+                <a16:creationId xmlns:a16="http://schemas.microsoft.com/office/drawing/2014/main" xmlns="" id="{80A64381-DDDA-41B6-8692-7D1CD7E4E200}"/>
               </a:ext>
             </a:extLst>
           </p:cNvPr>
@@ -6097,7 +6313,7 @@
           <p:cNvPr id="2" name="Title 1">
             <a:extLst>
               <a:ext uri="{FF2B5EF4-FFF2-40B4-BE49-F238E27FC236}">
-                <a16:creationId xmlns:a16="http://schemas.microsoft.com/office/drawing/2014/main" id="{5C4D0B21-0753-4B41-AC6C-587C83C7DB53}"/>
+                <a16:creationId xmlns:a16="http://schemas.microsoft.com/office/drawing/2014/main" xmlns="" id="{5C4D0B21-0753-4B41-AC6C-587C83C7DB53}"/>
               </a:ext>
             </a:extLst>
           </p:cNvPr>
@@ -6132,7 +6348,7 @@
           <p:cNvPr id="11" name="Content Placeholder 10">
             <a:extLst>
               <a:ext uri="{FF2B5EF4-FFF2-40B4-BE49-F238E27FC236}">
-                <a16:creationId xmlns:a16="http://schemas.microsoft.com/office/drawing/2014/main" id="{C7177770-119C-42E0-955E-CB3C05AE5373}"/>
+                <a16:creationId xmlns:a16="http://schemas.microsoft.com/office/drawing/2014/main" xmlns="" id="{C7177770-119C-42E0-955E-CB3C05AE5373}"/>
               </a:ext>
             </a:extLst>
           </p:cNvPr>
@@ -6144,7 +6360,7 @@
           </p:nvPr>
         </p:nvPicPr>
         <p:blipFill>
-          <a:blip r:embed="rId3">
+          <a:blip r:embed="rId3" cstate="print">
             <a:extLst>
               <a:ext uri="{28A0092B-C50C-407E-A947-70E740481C1C}">
                 <a14:useLocalDpi xmlns:a14="http://schemas.microsoft.com/office/drawing/2010/main" val="0"/>
@@ -6167,7 +6383,7 @@
           <p:cNvPr id="12" name="TextBox 11">
             <a:extLst>
               <a:ext uri="{FF2B5EF4-FFF2-40B4-BE49-F238E27FC236}">
-                <a16:creationId xmlns:a16="http://schemas.microsoft.com/office/drawing/2014/main" id="{8284F7CC-9A38-417D-8531-16A4994B48B7}"/>
+                <a16:creationId xmlns:a16="http://schemas.microsoft.com/office/drawing/2014/main" xmlns="" id="{8284F7CC-9A38-417D-8531-16A4994B48B7}"/>
               </a:ext>
             </a:extLst>
           </p:cNvPr>
@@ -6203,7 +6419,7 @@
           <p:cNvPr id="13" name="TextBox 12">
             <a:extLst>
               <a:ext uri="{FF2B5EF4-FFF2-40B4-BE49-F238E27FC236}">
-                <a16:creationId xmlns:a16="http://schemas.microsoft.com/office/drawing/2014/main" id="{6C355E1C-279A-429C-9CD8-D18BA01DB53F}"/>
+                <a16:creationId xmlns:a16="http://schemas.microsoft.com/office/drawing/2014/main" xmlns="" id="{6C355E1C-279A-429C-9CD8-D18BA01DB53F}"/>
               </a:ext>
             </a:extLst>
           </p:cNvPr>
@@ -6239,7 +6455,7 @@
           <p:cNvPr id="14" name="TextBox 13">
             <a:extLst>
               <a:ext uri="{FF2B5EF4-FFF2-40B4-BE49-F238E27FC236}">
-                <a16:creationId xmlns:a16="http://schemas.microsoft.com/office/drawing/2014/main" id="{93FB5240-AB72-4D79-B1DE-72774DE02A77}"/>
+                <a16:creationId xmlns:a16="http://schemas.microsoft.com/office/drawing/2014/main" xmlns="" id="{93FB5240-AB72-4D79-B1DE-72774DE02A77}"/>
               </a:ext>
             </a:extLst>
           </p:cNvPr>
@@ -6316,7 +6532,7 @@
           <p:cNvPr id="2" name="Title 1">
             <a:extLst>
               <a:ext uri="{FF2B5EF4-FFF2-40B4-BE49-F238E27FC236}">
-                <a16:creationId xmlns:a16="http://schemas.microsoft.com/office/drawing/2014/main" id="{BBF33B28-E476-42DF-8EB9-D8B3BE02EB1D}"/>
+                <a16:creationId xmlns:a16="http://schemas.microsoft.com/office/drawing/2014/main" xmlns="" id="{BBF33B28-E476-42DF-8EB9-D8B3BE02EB1D}"/>
               </a:ext>
             </a:extLst>
           </p:cNvPr>
@@ -6359,7 +6575,7 @@
           <p:cNvPr id="11" name="Content Placeholder 10">
             <a:extLst>
               <a:ext uri="{FF2B5EF4-FFF2-40B4-BE49-F238E27FC236}">
-                <a16:creationId xmlns:a16="http://schemas.microsoft.com/office/drawing/2014/main" id="{23D3EEB0-B298-42ED-B4E3-9B0D66F2782B}"/>
+                <a16:creationId xmlns:a16="http://schemas.microsoft.com/office/drawing/2014/main" xmlns="" id="{23D3EEB0-B298-42ED-B4E3-9B0D66F2782B}"/>
               </a:ext>
             </a:extLst>
           </p:cNvPr>
@@ -6405,10 +6621,10 @@
           <p:cNvPr id="19" name="Freeform: Shape 18">
             <a:extLst>
               <a:ext uri="{FF2B5EF4-FFF2-40B4-BE49-F238E27FC236}">
-                <a16:creationId xmlns:a16="http://schemas.microsoft.com/office/drawing/2014/main" id="{1DB7C82F-AB7E-4F0C-B829-FA1B9C415180}"/>
+                <a16:creationId xmlns:a16="http://schemas.microsoft.com/office/drawing/2014/main" xmlns="" id="{1DB7C82F-AB7E-4F0C-B829-FA1B9C415180}"/>
               </a:ext>
               <a:ext uri="{C183D7F6-B498-43B3-948B-1728B52AA6E4}">
-                <adec:decorative xmlns:adec="http://schemas.microsoft.com/office/drawing/2017/decorative" val="1"/>
+                <adec:decorative xmlns:adec="http://schemas.microsoft.com/office/drawing/2017/decorative" xmlns="" val="1"/>
               </a:ext>
             </a:extLst>
           </p:cNvPr>
@@ -6418,7 +6634,7 @@
           <p:nvPr>
             <p:extLst>
               <p:ext uri="{386F3935-93C4-4BCD-93E2-E3B085C9AB24}">
-                <p16:designElem xmlns:p16="http://schemas.microsoft.com/office/powerpoint/2015/main" val="1"/>
+                <p16:designElem xmlns:p16="http://schemas.microsoft.com/office/powerpoint/2015/main" xmlns="" val="1"/>
               </p:ext>
             </p:extLst>
           </p:nvPr>
@@ -6572,7 +6788,7 @@
           <p:cNvPr id="9" name="Content Placeholder 5">
             <a:extLst>
               <a:ext uri="{FF2B5EF4-FFF2-40B4-BE49-F238E27FC236}">
-                <a16:creationId xmlns:a16="http://schemas.microsoft.com/office/drawing/2014/main" id="{DDB8BD44-875F-4192-93E3-313E4E3A4051}"/>
+                <a16:creationId xmlns:a16="http://schemas.microsoft.com/office/drawing/2014/main" xmlns="" id="{DDB8BD44-875F-4192-93E3-313E4E3A4051}"/>
               </a:ext>
             </a:extLst>
           </p:cNvPr>
@@ -6678,7 +6894,7 @@
           <p:cNvPr id="13" name="Title 1">
             <a:extLst>
               <a:ext uri="{FF2B5EF4-FFF2-40B4-BE49-F238E27FC236}">
-                <a16:creationId xmlns:a16="http://schemas.microsoft.com/office/drawing/2014/main" id="{0B189842-8446-483C-9CF8-B38D33D9ADF9}"/>
+                <a16:creationId xmlns:a16="http://schemas.microsoft.com/office/drawing/2014/main" xmlns="" id="{0B189842-8446-483C-9CF8-B38D33D9ADF9}"/>
               </a:ext>
             </a:extLst>
           </p:cNvPr>
@@ -6732,6 +6948,10 @@
               </a:rPr>
               <a:t>: a map of code duplicates on Git Hub</a:t>
             </a:r>
+            <a:r>
+              <a:rPr lang="en-US" sz="4700" dirty="0"/>
+              <a:t/>
+            </a:r>
             <a:br>
               <a:rPr lang="en-US" sz="4700" dirty="0"/>
             </a:br>
@@ -6748,6 +6968,361 @@
   </p:cSld>
   <p:clrMapOvr>
     <a:overrideClrMapping bg1="dk1" tx1="lt1" bg2="dk2" tx2="lt2" accent1="accent1" accent2="accent2" accent3="accent3" accent4="accent4" accent5="accent5" accent6="accent6" hlink="hlink" folHlink="folHlink"/>
+  </p:clrMapOvr>
+</p:sld>
+</file>
+
+<file path=ppt/slides/slide6.xml><?xml version="1.0" encoding="utf-8"?>
+<p:sld xmlns:a="http://schemas.openxmlformats.org/drawingml/2006/main" xmlns:r="http://schemas.openxmlformats.org/officeDocument/2006/relationships" xmlns:p="http://schemas.openxmlformats.org/presentationml/2006/main">
+  <p:cSld>
+    <p:spTree>
+      <p:nvGrpSpPr>
+        <p:cNvPr id="1" name=""/>
+        <p:cNvGrpSpPr/>
+        <p:nvPr/>
+      </p:nvGrpSpPr>
+      <p:grpSpPr>
+        <a:xfrm>
+          <a:off x="0" y="0"/>
+          <a:ext cx="0" cy="0"/>
+          <a:chOff x="0" y="0"/>
+          <a:chExt cx="0" cy="0"/>
+        </a:xfrm>
+      </p:grpSpPr>
+      <p:sp>
+        <p:nvSpPr>
+          <p:cNvPr id="2" name="Title 1"/>
+          <p:cNvSpPr>
+            <a:spLocks noGrp="1"/>
+          </p:cNvSpPr>
+          <p:nvPr>
+            <p:ph type="title"/>
+          </p:nvPr>
+        </p:nvSpPr>
+        <p:spPr/>
+        <p:txBody>
+          <a:bodyPr/>
+          <a:lstStyle/>
+          <a:p>
+            <a:pPr algn="ctr"/>
+            <a:r>
+              <a:rPr lang="en-GB" dirty="0" smtClean="0"/>
+              <a:t>WTF should we do now</a:t>
+            </a:r>
+            <a:endParaRPr lang="bg-BG" dirty="0"/>
+          </a:p>
+        </p:txBody>
+      </p:sp>
+      <p:pic>
+        <p:nvPicPr>
+          <p:cNvPr id="4" name="Content Placeholder 3"/>
+          <p:cNvPicPr>
+            <a:picLocks noGrp="1" noChangeAspect="1"/>
+          </p:cNvPicPr>
+          <p:nvPr>
+            <p:ph idx="1"/>
+          </p:nvPr>
+        </p:nvPicPr>
+        <p:blipFill>
+          <a:blip r:embed="rId2">
+            <a:extLst>
+              <a:ext uri="{28A0092B-C50C-407E-A947-70E740481C1C}">
+                <a14:useLocalDpi xmlns:a14="http://schemas.microsoft.com/office/drawing/2010/main" val="0"/>
+              </a:ext>
+            </a:extLst>
+          </a:blip>
+          <a:stretch>
+            <a:fillRect/>
+          </a:stretch>
+        </p:blipFill>
+        <p:spPr>
+          <a:xfrm>
+            <a:off x="4231141" y="1341531"/>
+            <a:ext cx="3729718" cy="4351338"/>
+          </a:xfrm>
+        </p:spPr>
+      </p:pic>
+    </p:spTree>
+    <p:extLst>
+      <p:ext uri="{BB962C8B-B14F-4D97-AF65-F5344CB8AC3E}">
+        <p14:creationId xmlns:p14="http://schemas.microsoft.com/office/powerpoint/2010/main" val="4039247857"/>
+      </p:ext>
+    </p:extLst>
+  </p:cSld>
+  <p:clrMapOvr>
+    <a:masterClrMapping/>
+  </p:clrMapOvr>
+</p:sld>
+</file>
+
+<file path=ppt/slides/slide7.xml><?xml version="1.0" encoding="utf-8"?>
+<p:sld xmlns:a="http://schemas.openxmlformats.org/drawingml/2006/main" xmlns:r="http://schemas.openxmlformats.org/officeDocument/2006/relationships" xmlns:p="http://schemas.openxmlformats.org/presentationml/2006/main">
+  <p:cSld>
+    <p:spTree>
+      <p:nvGrpSpPr>
+        <p:cNvPr id="1" name=""/>
+        <p:cNvGrpSpPr/>
+        <p:nvPr/>
+      </p:nvGrpSpPr>
+      <p:grpSpPr>
+        <a:xfrm>
+          <a:off x="0" y="0"/>
+          <a:ext cx="0" cy="0"/>
+          <a:chOff x="0" y="0"/>
+          <a:chExt cx="0" cy="0"/>
+        </a:xfrm>
+      </p:grpSpPr>
+      <p:sp>
+        <p:nvSpPr>
+          <p:cNvPr id="2" name="Title 1"/>
+          <p:cNvSpPr>
+            <a:spLocks noGrp="1"/>
+          </p:cNvSpPr>
+          <p:nvPr>
+            <p:ph type="title"/>
+          </p:nvPr>
+        </p:nvSpPr>
+        <p:spPr/>
+        <p:txBody>
+          <a:bodyPr/>
+          <a:lstStyle/>
+          <a:p>
+            <a:r>
+              <a:rPr lang="en-GB" dirty="0" err="1" smtClean="0"/>
+              <a:t>Monorepo</a:t>
+            </a:r>
+            <a:endParaRPr lang="bg-BG" dirty="0"/>
+          </a:p>
+        </p:txBody>
+      </p:sp>
+      <p:pic>
+        <p:nvPicPr>
+          <p:cNvPr id="4" name="Content Placeholder 3"/>
+          <p:cNvPicPr>
+            <a:picLocks noGrp="1" noChangeAspect="1"/>
+          </p:cNvPicPr>
+          <p:nvPr>
+            <p:ph idx="1"/>
+          </p:nvPr>
+        </p:nvPicPr>
+        <p:blipFill>
+          <a:blip r:embed="rId2" cstate="print">
+            <a:extLst>
+              <a:ext uri="{28A0092B-C50C-407E-A947-70E740481C1C}">
+                <a14:useLocalDpi xmlns:a14="http://schemas.microsoft.com/office/drawing/2010/main" val="0"/>
+              </a:ext>
+            </a:extLst>
+          </a:blip>
+          <a:stretch>
+            <a:fillRect/>
+          </a:stretch>
+        </p:blipFill>
+        <p:spPr>
+          <a:xfrm>
+            <a:off x="5810292" y="1027906"/>
+            <a:ext cx="5543508" cy="5127745"/>
+          </a:xfrm>
+        </p:spPr>
+      </p:pic>
+      <p:sp>
+        <p:nvSpPr>
+          <p:cNvPr id="5" name="TextBox 4"/>
+          <p:cNvSpPr txBox="1"/>
+          <p:nvPr/>
+        </p:nvSpPr>
+        <p:spPr>
+          <a:xfrm>
+            <a:off x="838200" y="3591778"/>
+            <a:ext cx="5199529" cy="2246769"/>
+          </a:xfrm>
+          <a:prstGeom prst="rect">
+            <a:avLst/>
+          </a:prstGeom>
+          <a:noFill/>
+        </p:spPr>
+        <p:txBody>
+          <a:bodyPr wrap="square" rtlCol="0">
+            <a:spAutoFit/>
+          </a:bodyPr>
+          <a:lstStyle/>
+          <a:p>
+            <a:r>
+              <a:rPr lang="en-US" sz="2800" dirty="0"/>
+              <a:t>"</a:t>
+            </a:r>
+            <a:r>
+              <a:rPr lang="en-US" sz="2800" dirty="0" err="1"/>
+              <a:t>Monorepo</a:t>
+            </a:r>
+            <a:r>
+              <a:rPr lang="en-US" sz="2800" dirty="0"/>
+              <a:t>" or "</a:t>
+            </a:r>
+            <a:r>
+              <a:rPr lang="en-US" sz="2800" dirty="0" err="1"/>
+              <a:t>Molonolithic</a:t>
+            </a:r>
+            <a:r>
+              <a:rPr lang="en-US" sz="2800" dirty="0"/>
+              <a:t> repository" is a software development strategy where multiple projects are stored in single repository</a:t>
+            </a:r>
+            <a:endParaRPr lang="bg-BG" sz="2800" dirty="0"/>
+          </a:p>
+        </p:txBody>
+      </p:sp>
+    </p:spTree>
+    <p:extLst>
+      <p:ext uri="{BB962C8B-B14F-4D97-AF65-F5344CB8AC3E}">
+        <p14:creationId xmlns:p14="http://schemas.microsoft.com/office/powerpoint/2010/main" val="4056090553"/>
+      </p:ext>
+    </p:extLst>
+  </p:cSld>
+  <p:clrMapOvr>
+    <a:masterClrMapping/>
+  </p:clrMapOvr>
+</p:sld>
+</file>
+
+<file path=ppt/slides/slide8.xml><?xml version="1.0" encoding="utf-8"?>
+<p:sld xmlns:a="http://schemas.openxmlformats.org/drawingml/2006/main" xmlns:r="http://schemas.openxmlformats.org/officeDocument/2006/relationships" xmlns:p="http://schemas.openxmlformats.org/presentationml/2006/main">
+  <p:cSld>
+    <p:spTree>
+      <p:nvGrpSpPr>
+        <p:cNvPr id="1" name=""/>
+        <p:cNvGrpSpPr/>
+        <p:nvPr/>
+      </p:nvGrpSpPr>
+      <p:grpSpPr>
+        <a:xfrm>
+          <a:off x="0" y="0"/>
+          <a:ext cx="0" cy="0"/>
+          <a:chOff x="0" y="0"/>
+          <a:chExt cx="0" cy="0"/>
+        </a:xfrm>
+      </p:grpSpPr>
+      <p:sp>
+        <p:nvSpPr>
+          <p:cNvPr id="2" name="Title 1"/>
+          <p:cNvSpPr>
+            <a:spLocks noGrp="1"/>
+          </p:cNvSpPr>
+          <p:nvPr>
+            <p:ph type="title"/>
+          </p:nvPr>
+        </p:nvSpPr>
+        <p:spPr/>
+        <p:txBody>
+          <a:bodyPr/>
+          <a:lstStyle/>
+          <a:p>
+            <a:r>
+              <a:rPr lang="en-GB" dirty="0" smtClean="0"/>
+              <a:t>What</a:t>
+            </a:r>
+            <a:endParaRPr lang="bg-BG" dirty="0"/>
+          </a:p>
+        </p:txBody>
+      </p:sp>
+      <p:sp>
+        <p:nvSpPr>
+          <p:cNvPr id="3" name="Content Placeholder 2"/>
+          <p:cNvSpPr>
+            <a:spLocks noGrp="1"/>
+          </p:cNvSpPr>
+          <p:nvPr>
+            <p:ph idx="1"/>
+          </p:nvPr>
+        </p:nvSpPr>
+        <p:spPr/>
+        <p:txBody>
+          <a:bodyPr/>
+          <a:lstStyle/>
+          <a:p>
+            <a:endParaRPr lang="bg-BG"/>
+          </a:p>
+        </p:txBody>
+      </p:sp>
+    </p:spTree>
+    <p:extLst>
+      <p:ext uri="{BB962C8B-B14F-4D97-AF65-F5344CB8AC3E}">
+        <p14:creationId xmlns:p14="http://schemas.microsoft.com/office/powerpoint/2010/main" val="2754435459"/>
+      </p:ext>
+    </p:extLst>
+  </p:cSld>
+  <p:clrMapOvr>
+    <a:masterClrMapping/>
+  </p:clrMapOvr>
+</p:sld>
+</file>
+
+<file path=ppt/slides/slide9.xml><?xml version="1.0" encoding="utf-8"?>
+<p:sld xmlns:a="http://schemas.openxmlformats.org/drawingml/2006/main" xmlns:r="http://schemas.openxmlformats.org/officeDocument/2006/relationships" xmlns:p="http://schemas.openxmlformats.org/presentationml/2006/main">
+  <p:cSld>
+    <p:spTree>
+      <p:nvGrpSpPr>
+        <p:cNvPr id="1" name=""/>
+        <p:cNvGrpSpPr/>
+        <p:nvPr/>
+      </p:nvGrpSpPr>
+      <p:grpSpPr>
+        <a:xfrm>
+          <a:off x="0" y="0"/>
+          <a:ext cx="0" cy="0"/>
+          <a:chOff x="0" y="0"/>
+          <a:chExt cx="0" cy="0"/>
+        </a:xfrm>
+      </p:grpSpPr>
+      <p:sp>
+        <p:nvSpPr>
+          <p:cNvPr id="2" name="Title 1"/>
+          <p:cNvSpPr>
+            <a:spLocks noGrp="1"/>
+          </p:cNvSpPr>
+          <p:nvPr>
+            <p:ph type="title"/>
+          </p:nvPr>
+        </p:nvSpPr>
+        <p:spPr/>
+        <p:txBody>
+          <a:bodyPr/>
+          <a:lstStyle/>
+          <a:p>
+            <a:r>
+              <a:rPr lang="en-GB" dirty="0" smtClean="0"/>
+              <a:t>Who</a:t>
+            </a:r>
+            <a:endParaRPr lang="bg-BG" dirty="0"/>
+          </a:p>
+        </p:txBody>
+      </p:sp>
+      <p:sp>
+        <p:nvSpPr>
+          <p:cNvPr id="3" name="Content Placeholder 2"/>
+          <p:cNvSpPr>
+            <a:spLocks noGrp="1"/>
+          </p:cNvSpPr>
+          <p:nvPr>
+            <p:ph idx="1"/>
+          </p:nvPr>
+        </p:nvSpPr>
+        <p:spPr/>
+        <p:txBody>
+          <a:bodyPr/>
+          <a:lstStyle/>
+          <a:p>
+            <a:endParaRPr lang="bg-BG"/>
+          </a:p>
+        </p:txBody>
+      </p:sp>
+    </p:spTree>
+    <p:extLst>
+      <p:ext uri="{BB962C8B-B14F-4D97-AF65-F5344CB8AC3E}">
+        <p14:creationId xmlns:p14="http://schemas.microsoft.com/office/powerpoint/2010/main" val="1966113609"/>
+      </p:ext>
+    </p:extLst>
+  </p:cSld>
+  <p:clrMapOvr>
+    <a:masterClrMapping/>
   </p:clrMapOvr>
 </p:sld>
 </file>

</xml_diff>